<commit_message>
Capítulo 10: Exercício do editor de texto.
</commit_message>
<xml_diff>
--- a/2-Java-Programmer-Modulo-II/18.Capitulo10.pptx
+++ b/2-Java-Programmer-Modulo-II/18.Capitulo10.pptx
@@ -5,7 +5,7 @@
     <p:sldMasterId id="2147483660" r:id="rId1"/>
   </p:sldMasterIdLst>
   <p:notesMasterIdLst>
-    <p:notesMasterId r:id="rId32"/>
+    <p:notesMasterId r:id="rId37"/>
   </p:notesMasterIdLst>
   <p:sldIdLst>
     <p:sldId id="256" r:id="rId2"/>
@@ -38,6 +38,11 @@
     <p:sldId id="430" r:id="rId29"/>
     <p:sldId id="316" r:id="rId30"/>
     <p:sldId id="431" r:id="rId31"/>
+    <p:sldId id="432" r:id="rId32"/>
+    <p:sldId id="433" r:id="rId33"/>
+    <p:sldId id="434" r:id="rId34"/>
+    <p:sldId id="435" r:id="rId35"/>
+    <p:sldId id="436" r:id="rId36"/>
   </p:sldIdLst>
   <p:sldSz cx="9144000" cy="6858000" type="screen4x3"/>
   <p:notesSz cx="6858000" cy="9144000"/>
@@ -2786,6 +2791,441 @@
                 <a:defRPr/>
               </a:pPr>
               <a:t>30</a:t>
+            </a:fld>
+            <a:endParaRPr lang="pt-BR"/>
+          </a:p>
+        </p:txBody>
+      </p:sp>
+    </p:spTree>
+  </p:cSld>
+  <p:clrMapOvr>
+    <a:masterClrMapping/>
+  </p:clrMapOvr>
+</p:notes>
+</file>
+
+<file path=ppt/notesSlides/notesSlide31.xml><?xml version="1.0" encoding="utf-8"?>
+<p:notes xmlns:a="http://schemas.openxmlformats.org/drawingml/2006/main" xmlns:r="http://schemas.openxmlformats.org/officeDocument/2006/relationships" xmlns:p="http://schemas.openxmlformats.org/presentationml/2006/main">
+  <p:cSld>
+    <p:spTree>
+      <p:nvGrpSpPr>
+        <p:cNvPr id="1" name=""/>
+        <p:cNvGrpSpPr/>
+        <p:nvPr/>
+      </p:nvGrpSpPr>
+      <p:grpSpPr>
+        <a:xfrm>
+          <a:off x="0" y="0"/>
+          <a:ext cx="0" cy="0"/>
+          <a:chOff x="0" y="0"/>
+          <a:chExt cx="0" cy="0"/>
+        </a:xfrm>
+      </p:grpSpPr>
+      <p:sp>
+        <p:nvSpPr>
+          <p:cNvPr id="2" name="Espaço Reservado para Imagem de Slide 1"/>
+          <p:cNvSpPr>
+            <a:spLocks noGrp="1" noRot="1" noChangeAspect="1"/>
+          </p:cNvSpPr>
+          <p:nvPr>
+            <p:ph type="sldImg"/>
+          </p:nvPr>
+        </p:nvSpPr>
+        <p:spPr/>
+      </p:sp>
+      <p:sp>
+        <p:nvSpPr>
+          <p:cNvPr id="3" name="Espaço Reservado para Anotações 2"/>
+          <p:cNvSpPr>
+            <a:spLocks noGrp="1"/>
+          </p:cNvSpPr>
+          <p:nvPr>
+            <p:ph type="body" idx="1"/>
+          </p:nvPr>
+        </p:nvSpPr>
+        <p:spPr/>
+        <p:txBody>
+          <a:bodyPr>
+            <a:normAutofit/>
+          </a:bodyPr>
+          <a:lstStyle/>
+          <a:p>
+            <a:endParaRPr lang="pt-BR"/>
+          </a:p>
+        </p:txBody>
+      </p:sp>
+      <p:sp>
+        <p:nvSpPr>
+          <p:cNvPr id="4" name="Espaço Reservado para Número de Slide 3"/>
+          <p:cNvSpPr>
+            <a:spLocks noGrp="1"/>
+          </p:cNvSpPr>
+          <p:nvPr>
+            <p:ph type="sldNum" sz="quarter" idx="10"/>
+          </p:nvPr>
+        </p:nvSpPr>
+        <p:spPr/>
+        <p:txBody>
+          <a:bodyPr/>
+          <a:lstStyle/>
+          <a:p>
+            <a:pPr>
+              <a:defRPr/>
+            </a:pPr>
+            <a:fld id="{373010A1-97EB-4147-B509-23B1A33D8481}" type="slidenum">
+              <a:rPr lang="pt-BR" smtClean="0"/>
+              <a:pPr>
+                <a:defRPr/>
+              </a:pPr>
+              <a:t>31</a:t>
+            </a:fld>
+            <a:endParaRPr lang="pt-BR"/>
+          </a:p>
+        </p:txBody>
+      </p:sp>
+    </p:spTree>
+  </p:cSld>
+  <p:clrMapOvr>
+    <a:masterClrMapping/>
+  </p:clrMapOvr>
+</p:notes>
+</file>
+
+<file path=ppt/notesSlides/notesSlide32.xml><?xml version="1.0" encoding="utf-8"?>
+<p:notes xmlns:a="http://schemas.openxmlformats.org/drawingml/2006/main" xmlns:r="http://schemas.openxmlformats.org/officeDocument/2006/relationships" xmlns:p="http://schemas.openxmlformats.org/presentationml/2006/main">
+  <p:cSld>
+    <p:spTree>
+      <p:nvGrpSpPr>
+        <p:cNvPr id="1" name=""/>
+        <p:cNvGrpSpPr/>
+        <p:nvPr/>
+      </p:nvGrpSpPr>
+      <p:grpSpPr>
+        <a:xfrm>
+          <a:off x="0" y="0"/>
+          <a:ext cx="0" cy="0"/>
+          <a:chOff x="0" y="0"/>
+          <a:chExt cx="0" cy="0"/>
+        </a:xfrm>
+      </p:grpSpPr>
+      <p:sp>
+        <p:nvSpPr>
+          <p:cNvPr id="2" name="Espaço Reservado para Imagem de Slide 1"/>
+          <p:cNvSpPr>
+            <a:spLocks noGrp="1" noRot="1" noChangeAspect="1"/>
+          </p:cNvSpPr>
+          <p:nvPr>
+            <p:ph type="sldImg"/>
+          </p:nvPr>
+        </p:nvSpPr>
+        <p:spPr/>
+      </p:sp>
+      <p:sp>
+        <p:nvSpPr>
+          <p:cNvPr id="3" name="Espaço Reservado para Anotações 2"/>
+          <p:cNvSpPr>
+            <a:spLocks noGrp="1"/>
+          </p:cNvSpPr>
+          <p:nvPr>
+            <p:ph type="body" idx="1"/>
+          </p:nvPr>
+        </p:nvSpPr>
+        <p:spPr/>
+        <p:txBody>
+          <a:bodyPr>
+            <a:normAutofit/>
+          </a:bodyPr>
+          <a:lstStyle/>
+          <a:p>
+            <a:endParaRPr lang="pt-BR"/>
+          </a:p>
+        </p:txBody>
+      </p:sp>
+      <p:sp>
+        <p:nvSpPr>
+          <p:cNvPr id="4" name="Espaço Reservado para Número de Slide 3"/>
+          <p:cNvSpPr>
+            <a:spLocks noGrp="1"/>
+          </p:cNvSpPr>
+          <p:nvPr>
+            <p:ph type="sldNum" sz="quarter" idx="10"/>
+          </p:nvPr>
+        </p:nvSpPr>
+        <p:spPr/>
+        <p:txBody>
+          <a:bodyPr/>
+          <a:lstStyle/>
+          <a:p>
+            <a:pPr>
+              <a:defRPr/>
+            </a:pPr>
+            <a:fld id="{373010A1-97EB-4147-B509-23B1A33D8481}" type="slidenum">
+              <a:rPr lang="pt-BR" smtClean="0"/>
+              <a:pPr>
+                <a:defRPr/>
+              </a:pPr>
+              <a:t>32</a:t>
+            </a:fld>
+            <a:endParaRPr lang="pt-BR"/>
+          </a:p>
+        </p:txBody>
+      </p:sp>
+    </p:spTree>
+  </p:cSld>
+  <p:clrMapOvr>
+    <a:masterClrMapping/>
+  </p:clrMapOvr>
+</p:notes>
+</file>
+
+<file path=ppt/notesSlides/notesSlide33.xml><?xml version="1.0" encoding="utf-8"?>
+<p:notes xmlns:a="http://schemas.openxmlformats.org/drawingml/2006/main" xmlns:r="http://schemas.openxmlformats.org/officeDocument/2006/relationships" xmlns:p="http://schemas.openxmlformats.org/presentationml/2006/main">
+  <p:cSld>
+    <p:spTree>
+      <p:nvGrpSpPr>
+        <p:cNvPr id="1" name=""/>
+        <p:cNvGrpSpPr/>
+        <p:nvPr/>
+      </p:nvGrpSpPr>
+      <p:grpSpPr>
+        <a:xfrm>
+          <a:off x="0" y="0"/>
+          <a:ext cx="0" cy="0"/>
+          <a:chOff x="0" y="0"/>
+          <a:chExt cx="0" cy="0"/>
+        </a:xfrm>
+      </p:grpSpPr>
+      <p:sp>
+        <p:nvSpPr>
+          <p:cNvPr id="2" name="Espaço Reservado para Imagem de Slide 1"/>
+          <p:cNvSpPr>
+            <a:spLocks noGrp="1" noRot="1" noChangeAspect="1"/>
+          </p:cNvSpPr>
+          <p:nvPr>
+            <p:ph type="sldImg"/>
+          </p:nvPr>
+        </p:nvSpPr>
+        <p:spPr/>
+      </p:sp>
+      <p:sp>
+        <p:nvSpPr>
+          <p:cNvPr id="3" name="Espaço Reservado para Anotações 2"/>
+          <p:cNvSpPr>
+            <a:spLocks noGrp="1"/>
+          </p:cNvSpPr>
+          <p:nvPr>
+            <p:ph type="body" idx="1"/>
+          </p:nvPr>
+        </p:nvSpPr>
+        <p:spPr/>
+        <p:txBody>
+          <a:bodyPr>
+            <a:normAutofit/>
+          </a:bodyPr>
+          <a:lstStyle/>
+          <a:p>
+            <a:endParaRPr lang="pt-BR"/>
+          </a:p>
+        </p:txBody>
+      </p:sp>
+      <p:sp>
+        <p:nvSpPr>
+          <p:cNvPr id="4" name="Espaço Reservado para Número de Slide 3"/>
+          <p:cNvSpPr>
+            <a:spLocks noGrp="1"/>
+          </p:cNvSpPr>
+          <p:nvPr>
+            <p:ph type="sldNum" sz="quarter" idx="10"/>
+          </p:nvPr>
+        </p:nvSpPr>
+        <p:spPr/>
+        <p:txBody>
+          <a:bodyPr/>
+          <a:lstStyle/>
+          <a:p>
+            <a:pPr>
+              <a:defRPr/>
+            </a:pPr>
+            <a:fld id="{373010A1-97EB-4147-B509-23B1A33D8481}" type="slidenum">
+              <a:rPr lang="pt-BR" smtClean="0"/>
+              <a:pPr>
+                <a:defRPr/>
+              </a:pPr>
+              <a:t>33</a:t>
+            </a:fld>
+            <a:endParaRPr lang="pt-BR"/>
+          </a:p>
+        </p:txBody>
+      </p:sp>
+    </p:spTree>
+  </p:cSld>
+  <p:clrMapOvr>
+    <a:masterClrMapping/>
+  </p:clrMapOvr>
+</p:notes>
+</file>
+
+<file path=ppt/notesSlides/notesSlide34.xml><?xml version="1.0" encoding="utf-8"?>
+<p:notes xmlns:a="http://schemas.openxmlformats.org/drawingml/2006/main" xmlns:r="http://schemas.openxmlformats.org/officeDocument/2006/relationships" xmlns:p="http://schemas.openxmlformats.org/presentationml/2006/main">
+  <p:cSld>
+    <p:spTree>
+      <p:nvGrpSpPr>
+        <p:cNvPr id="1" name=""/>
+        <p:cNvGrpSpPr/>
+        <p:nvPr/>
+      </p:nvGrpSpPr>
+      <p:grpSpPr>
+        <a:xfrm>
+          <a:off x="0" y="0"/>
+          <a:ext cx="0" cy="0"/>
+          <a:chOff x="0" y="0"/>
+          <a:chExt cx="0" cy="0"/>
+        </a:xfrm>
+      </p:grpSpPr>
+      <p:sp>
+        <p:nvSpPr>
+          <p:cNvPr id="2" name="Espaço Reservado para Imagem de Slide 1"/>
+          <p:cNvSpPr>
+            <a:spLocks noGrp="1" noRot="1" noChangeAspect="1"/>
+          </p:cNvSpPr>
+          <p:nvPr>
+            <p:ph type="sldImg"/>
+          </p:nvPr>
+        </p:nvSpPr>
+        <p:spPr/>
+      </p:sp>
+      <p:sp>
+        <p:nvSpPr>
+          <p:cNvPr id="3" name="Espaço Reservado para Anotações 2"/>
+          <p:cNvSpPr>
+            <a:spLocks noGrp="1"/>
+          </p:cNvSpPr>
+          <p:nvPr>
+            <p:ph type="body" idx="1"/>
+          </p:nvPr>
+        </p:nvSpPr>
+        <p:spPr/>
+        <p:txBody>
+          <a:bodyPr>
+            <a:normAutofit/>
+          </a:bodyPr>
+          <a:lstStyle/>
+          <a:p>
+            <a:endParaRPr lang="pt-BR"/>
+          </a:p>
+        </p:txBody>
+      </p:sp>
+      <p:sp>
+        <p:nvSpPr>
+          <p:cNvPr id="4" name="Espaço Reservado para Número de Slide 3"/>
+          <p:cNvSpPr>
+            <a:spLocks noGrp="1"/>
+          </p:cNvSpPr>
+          <p:nvPr>
+            <p:ph type="sldNum" sz="quarter" idx="10"/>
+          </p:nvPr>
+        </p:nvSpPr>
+        <p:spPr/>
+        <p:txBody>
+          <a:bodyPr/>
+          <a:lstStyle/>
+          <a:p>
+            <a:pPr>
+              <a:defRPr/>
+            </a:pPr>
+            <a:fld id="{373010A1-97EB-4147-B509-23B1A33D8481}" type="slidenum">
+              <a:rPr lang="pt-BR" smtClean="0"/>
+              <a:pPr>
+                <a:defRPr/>
+              </a:pPr>
+              <a:t>34</a:t>
+            </a:fld>
+            <a:endParaRPr lang="pt-BR"/>
+          </a:p>
+        </p:txBody>
+      </p:sp>
+    </p:spTree>
+  </p:cSld>
+  <p:clrMapOvr>
+    <a:masterClrMapping/>
+  </p:clrMapOvr>
+</p:notes>
+</file>
+
+<file path=ppt/notesSlides/notesSlide35.xml><?xml version="1.0" encoding="utf-8"?>
+<p:notes xmlns:a="http://schemas.openxmlformats.org/drawingml/2006/main" xmlns:r="http://schemas.openxmlformats.org/officeDocument/2006/relationships" xmlns:p="http://schemas.openxmlformats.org/presentationml/2006/main">
+  <p:cSld>
+    <p:spTree>
+      <p:nvGrpSpPr>
+        <p:cNvPr id="1" name=""/>
+        <p:cNvGrpSpPr/>
+        <p:nvPr/>
+      </p:nvGrpSpPr>
+      <p:grpSpPr>
+        <a:xfrm>
+          <a:off x="0" y="0"/>
+          <a:ext cx="0" cy="0"/>
+          <a:chOff x="0" y="0"/>
+          <a:chExt cx="0" cy="0"/>
+        </a:xfrm>
+      </p:grpSpPr>
+      <p:sp>
+        <p:nvSpPr>
+          <p:cNvPr id="2" name="Espaço Reservado para Imagem de Slide 1"/>
+          <p:cNvSpPr>
+            <a:spLocks noGrp="1" noRot="1" noChangeAspect="1"/>
+          </p:cNvSpPr>
+          <p:nvPr>
+            <p:ph type="sldImg"/>
+          </p:nvPr>
+        </p:nvSpPr>
+        <p:spPr/>
+      </p:sp>
+      <p:sp>
+        <p:nvSpPr>
+          <p:cNvPr id="3" name="Espaço Reservado para Anotações 2"/>
+          <p:cNvSpPr>
+            <a:spLocks noGrp="1"/>
+          </p:cNvSpPr>
+          <p:nvPr>
+            <p:ph type="body" idx="1"/>
+          </p:nvPr>
+        </p:nvSpPr>
+        <p:spPr/>
+        <p:txBody>
+          <a:bodyPr>
+            <a:normAutofit/>
+          </a:bodyPr>
+          <a:lstStyle/>
+          <a:p>
+            <a:endParaRPr lang="pt-BR"/>
+          </a:p>
+        </p:txBody>
+      </p:sp>
+      <p:sp>
+        <p:nvSpPr>
+          <p:cNvPr id="4" name="Espaço Reservado para Número de Slide 3"/>
+          <p:cNvSpPr>
+            <a:spLocks noGrp="1"/>
+          </p:cNvSpPr>
+          <p:nvPr>
+            <p:ph type="sldNum" sz="quarter" idx="10"/>
+          </p:nvPr>
+        </p:nvSpPr>
+        <p:spPr/>
+        <p:txBody>
+          <a:bodyPr/>
+          <a:lstStyle/>
+          <a:p>
+            <a:pPr>
+              <a:defRPr/>
+            </a:pPr>
+            <a:fld id="{373010A1-97EB-4147-B509-23B1A33D8481}" type="slidenum">
+              <a:rPr lang="pt-BR" smtClean="0"/>
+              <a:pPr>
+                <a:defRPr/>
+              </a:pPr>
+              <a:t>35</a:t>
             </a:fld>
             <a:endParaRPr lang="pt-BR"/>
           </a:p>
@@ -14484,11 +14924,7 @@
           <a:p>
             <a:r>
               <a:rPr lang="pt-BR" sz="2800" dirty="0" smtClean="0"/>
-              <a:t>Arquivos </a:t>
-            </a:r>
-            <a:r>
-              <a:rPr lang="pt-BR" sz="2800" dirty="0" smtClean="0"/>
-              <a:t>texto</a:t>
+              <a:t>Arquivos texto</a:t>
             </a:r>
           </a:p>
           <a:p>
@@ -19373,38 +19809,135 @@
             <p:ph type="title"/>
           </p:nvPr>
         </p:nvSpPr>
-        <p:spPr/>
+        <p:spPr>
+          <a:xfrm>
+            <a:off x="251520" y="274638"/>
+            <a:ext cx="8496944" cy="1143000"/>
+          </a:xfrm>
+        </p:spPr>
         <p:txBody>
           <a:bodyPr/>
           <a:lstStyle/>
           <a:p>
             <a:r>
-              <a:rPr lang="pt-BR" dirty="0" smtClean="0"/>
-              <a:t>Exercício – Editor de Texto</a:t>
-            </a:r>
-            <a:endParaRPr lang="pt-BR" dirty="0"/>
+              <a:rPr lang="pt-BR" sz="4400" dirty="0" smtClean="0"/>
+              <a:t>Exercício – Editor de </a:t>
+            </a:r>
+            <a:r>
+              <a:rPr lang="pt-BR" sz="4400" dirty="0" smtClean="0"/>
+              <a:t>Texto em Java</a:t>
+            </a:r>
+            <a:endParaRPr lang="pt-BR" sz="4400" dirty="0"/>
           </a:p>
         </p:txBody>
       </p:sp>
       <p:sp>
         <p:nvSpPr>
-          <p:cNvPr id="3" name="Espaço Reservado para Conteúdo 2"/>
+          <p:cNvPr id="5" name="Espaço Reservado para Conteúdo 4"/>
           <p:cNvSpPr>
             <a:spLocks noGrp="1"/>
           </p:cNvSpPr>
           <p:nvPr>
-            <p:ph idx="1"/>
+            <p:ph sz="half" idx="1"/>
           </p:nvPr>
         </p:nvSpPr>
-        <p:spPr/>
+        <p:spPr>
+          <a:xfrm>
+            <a:off x="457200" y="1600201"/>
+            <a:ext cx="7787208" cy="1756792"/>
+          </a:xfrm>
+        </p:spPr>
         <p:txBody>
           <a:bodyPr/>
           <a:lstStyle/>
           <a:p>
+            <a:r>
+              <a:rPr lang="pt-BR" dirty="0" smtClean="0"/>
+              <a:t>A partir da classe </a:t>
+            </a:r>
+            <a:r>
+              <a:rPr lang="pt-BR" dirty="0" err="1" smtClean="0"/>
+              <a:t>TabajaraEditorFrame</a:t>
+            </a:r>
+            <a:r>
+              <a:rPr lang="pt-BR" dirty="0" smtClean="0"/>
+              <a:t> construída pelo Eclipse VE, implemente os comandos do itens “</a:t>
+            </a:r>
+            <a:r>
+              <a:rPr lang="pt-BR" dirty="0" smtClean="0">
+                <a:solidFill>
+                  <a:srgbClr val="FFC000"/>
+                </a:solidFill>
+              </a:rPr>
+              <a:t>Novo</a:t>
+            </a:r>
+            <a:r>
+              <a:rPr lang="pt-BR" dirty="0" smtClean="0"/>
+              <a:t>”, “</a:t>
+            </a:r>
+            <a:r>
+              <a:rPr lang="pt-BR" dirty="0" smtClean="0">
+                <a:solidFill>
+                  <a:srgbClr val="FFC000"/>
+                </a:solidFill>
+              </a:rPr>
+              <a:t>Abrir</a:t>
+            </a:r>
+            <a:r>
+              <a:rPr lang="pt-BR" dirty="0" smtClean="0"/>
+              <a:t>”, “</a:t>
+            </a:r>
+            <a:r>
+              <a:rPr lang="pt-BR" dirty="0" smtClean="0">
+                <a:solidFill>
+                  <a:srgbClr val="FFC000"/>
+                </a:solidFill>
+              </a:rPr>
+              <a:t>Salvar</a:t>
+            </a:r>
+            <a:r>
+              <a:rPr lang="pt-BR" dirty="0" smtClean="0"/>
+              <a:t>” e “</a:t>
+            </a:r>
+            <a:r>
+              <a:rPr lang="pt-BR" dirty="0" smtClean="0">
+                <a:solidFill>
+                  <a:srgbClr val="FFC000"/>
+                </a:solidFill>
+              </a:rPr>
+              <a:t>Sair</a:t>
+            </a:r>
+            <a:r>
+              <a:rPr lang="pt-BR" dirty="0" smtClean="0"/>
+              <a:t>” conforme especificado no próximo slide</a:t>
+            </a:r>
             <a:endParaRPr lang="pt-BR" dirty="0"/>
           </a:p>
         </p:txBody>
       </p:sp>
+      <p:pic>
+        <p:nvPicPr>
+          <p:cNvPr id="7" name="Espaço Reservado para Conteúdo 6" descr="TabajaraEditorFrame.png"/>
+          <p:cNvPicPr>
+            <a:picLocks noGrp="1" noChangeAspect="1"/>
+          </p:cNvPicPr>
+          <p:nvPr>
+            <p:ph sz="half" idx="2"/>
+          </p:nvPr>
+        </p:nvPicPr>
+        <p:blipFill>
+          <a:blip r:embed="rId3" cstate="print"/>
+          <a:stretch>
+            <a:fillRect/>
+          </a:stretch>
+        </p:blipFill>
+        <p:spPr>
+          <a:xfrm>
+            <a:off x="1709903" y="3632421"/>
+            <a:ext cx="5382377" cy="2676899"/>
+          </a:xfrm>
+        </p:spPr>
+      </p:pic>
       <p:sp>
         <p:nvSpPr>
           <p:cNvPr id="4" name="Espaço Reservado para Número de Slide 3"/>
@@ -19439,6 +19972,13 @@
   <p:clrMapOvr>
     <a:masterClrMapping/>
   </p:clrMapOvr>
+  <p:timing>
+    <p:tnLst>
+      <p:par>
+        <p:cTn id="1" dur="indefinite" restart="never" nodeType="tmRoot"/>
+      </p:par>
+    </p:tnLst>
+  </p:timing>
 </p:sld>
 </file>
 
@@ -19629,16 +20169,25 @@
             <p:ph type="title"/>
           </p:nvPr>
         </p:nvSpPr>
-        <p:spPr/>
+        <p:spPr>
+          <a:xfrm>
+            <a:off x="251520" y="274638"/>
+            <a:ext cx="7467600" cy="1143000"/>
+          </a:xfrm>
+        </p:spPr>
         <p:txBody>
           <a:bodyPr/>
           <a:lstStyle/>
           <a:p>
             <a:r>
-              <a:rPr lang="pt-BR" dirty="0" smtClean="0"/>
-              <a:t>Exercício (fim)</a:t>
-            </a:r>
-            <a:endParaRPr lang="pt-BR" dirty="0"/>
+              <a:rPr lang="pt-BR" sz="4400" dirty="0" smtClean="0"/>
+              <a:t>Exercício </a:t>
+            </a:r>
+            <a:r>
+              <a:rPr lang="pt-BR" sz="4400" dirty="0" smtClean="0"/>
+              <a:t>(continuação)</a:t>
+            </a:r>
+            <a:endParaRPr lang="pt-BR" sz="4400" dirty="0"/>
           </a:p>
         </p:txBody>
       </p:sp>
@@ -19657,7 +20206,30 @@
           <a:bodyPr/>
           <a:lstStyle/>
           <a:p>
-            <a:endParaRPr lang="pt-BR" dirty="0"/>
+            <a:r>
+              <a:rPr lang="pt-BR" sz="2400" dirty="0" smtClean="0"/>
+              <a:t>Comando “</a:t>
+            </a:r>
+            <a:r>
+              <a:rPr lang="pt-BR" sz="2400" dirty="0" smtClean="0">
+                <a:solidFill>
+                  <a:srgbClr val="FFC000"/>
+                </a:solidFill>
+              </a:rPr>
+              <a:t>Novo</a:t>
+            </a:r>
+            <a:r>
+              <a:rPr lang="pt-BR" sz="2400" dirty="0" smtClean="0"/>
+              <a:t>”</a:t>
+            </a:r>
+          </a:p>
+          <a:p>
+            <a:pPr lvl="1"/>
+            <a:r>
+              <a:rPr lang="pt-BR" sz="2000" dirty="0" smtClean="0"/>
+              <a:t>Limpa a caixa de texto</a:t>
+            </a:r>
+            <a:endParaRPr lang="pt-BR" sz="2000" dirty="0" smtClean="0"/>
           </a:p>
         </p:txBody>
       </p:sp>
@@ -19695,6 +20267,1132 @@
   <p:clrMapOvr>
     <a:masterClrMapping/>
   </p:clrMapOvr>
+  <p:timing>
+    <p:tnLst>
+      <p:par>
+        <p:cTn id="1" dur="indefinite" restart="never" nodeType="tmRoot"/>
+      </p:par>
+    </p:tnLst>
+  </p:timing>
+</p:sld>
+</file>
+
+<file path=ppt/slides/slide31.xml><?xml version="1.0" encoding="utf-8"?>
+<p:sld xmlns:a="http://schemas.openxmlformats.org/drawingml/2006/main" xmlns:r="http://schemas.openxmlformats.org/officeDocument/2006/relationships" xmlns:p="http://schemas.openxmlformats.org/presentationml/2006/main">
+  <p:cSld>
+    <p:spTree>
+      <p:nvGrpSpPr>
+        <p:cNvPr id="1" name=""/>
+        <p:cNvGrpSpPr/>
+        <p:nvPr/>
+      </p:nvGrpSpPr>
+      <p:grpSpPr>
+        <a:xfrm>
+          <a:off x="0" y="0"/>
+          <a:ext cx="0" cy="0"/>
+          <a:chOff x="0" y="0"/>
+          <a:chExt cx="0" cy="0"/>
+        </a:xfrm>
+      </p:grpSpPr>
+      <p:sp>
+        <p:nvSpPr>
+          <p:cNvPr id="2" name="Título 1"/>
+          <p:cNvSpPr>
+            <a:spLocks noGrp="1"/>
+          </p:cNvSpPr>
+          <p:nvPr>
+            <p:ph type="title"/>
+          </p:nvPr>
+        </p:nvSpPr>
+        <p:spPr>
+          <a:xfrm>
+            <a:off x="251520" y="274638"/>
+            <a:ext cx="7467600" cy="1143000"/>
+          </a:xfrm>
+        </p:spPr>
+        <p:txBody>
+          <a:bodyPr/>
+          <a:lstStyle/>
+          <a:p>
+            <a:r>
+              <a:rPr lang="pt-BR" sz="4400" dirty="0" smtClean="0"/>
+              <a:t>Exercício </a:t>
+            </a:r>
+            <a:r>
+              <a:rPr lang="pt-BR" sz="4400" dirty="0" smtClean="0"/>
+              <a:t>(continuação)</a:t>
+            </a:r>
+            <a:endParaRPr lang="pt-BR" sz="4400" dirty="0"/>
+          </a:p>
+        </p:txBody>
+      </p:sp>
+      <p:sp>
+        <p:nvSpPr>
+          <p:cNvPr id="3" name="Espaço Reservado para Conteúdo 2"/>
+          <p:cNvSpPr>
+            <a:spLocks noGrp="1"/>
+          </p:cNvSpPr>
+          <p:nvPr>
+            <p:ph idx="1"/>
+          </p:nvPr>
+        </p:nvSpPr>
+        <p:spPr/>
+        <p:txBody>
+          <a:bodyPr/>
+          <a:lstStyle/>
+          <a:p>
+            <a:r>
+              <a:rPr lang="pt-BR" sz="2400" dirty="0" smtClean="0"/>
+              <a:t>Comando “</a:t>
+            </a:r>
+            <a:r>
+              <a:rPr lang="pt-BR" sz="2400" dirty="0" smtClean="0">
+                <a:solidFill>
+                  <a:srgbClr val="FFC000"/>
+                </a:solidFill>
+              </a:rPr>
+              <a:t>Abrir</a:t>
+            </a:r>
+            <a:r>
+              <a:rPr lang="pt-BR" sz="2400" dirty="0" smtClean="0"/>
+              <a:t>”</a:t>
+            </a:r>
+          </a:p>
+          <a:p>
+            <a:pPr lvl="1">
+              <a:spcBef>
+                <a:spcPts val="1800"/>
+              </a:spcBef>
+            </a:pPr>
+            <a:r>
+              <a:rPr lang="pt-BR" sz="2000" dirty="0" smtClean="0"/>
+              <a:t>Solicita que o usuário escolha um arquivo através do comando </a:t>
+            </a:r>
+            <a:r>
+              <a:rPr lang="pt-BR" sz="2000" dirty="0" err="1" smtClean="0">
+                <a:solidFill>
+                  <a:srgbClr val="FFC000"/>
+                </a:solidFill>
+              </a:rPr>
+              <a:t>jfcArquivo</a:t>
+            </a:r>
+            <a:r>
+              <a:rPr lang="pt-BR" sz="2000" dirty="0" smtClean="0">
+                <a:solidFill>
+                  <a:srgbClr val="FFC000"/>
+                </a:solidFill>
+              </a:rPr>
+              <a:t>.</a:t>
+            </a:r>
+            <a:r>
+              <a:rPr lang="pt-BR" sz="2000" dirty="0" err="1" smtClean="0">
+                <a:solidFill>
+                  <a:srgbClr val="FFC000"/>
+                </a:solidFill>
+              </a:rPr>
+              <a:t>showOpenDialog</a:t>
+            </a:r>
+            <a:r>
+              <a:rPr lang="pt-BR" sz="2000" dirty="0" smtClean="0">
+                <a:solidFill>
+                  <a:srgbClr val="FFC000"/>
+                </a:solidFill>
+              </a:rPr>
+              <a:t>()</a:t>
+            </a:r>
+            <a:r>
+              <a:rPr lang="pt-BR" sz="2000" dirty="0" smtClean="0"/>
+              <a:t>;</a:t>
+            </a:r>
+          </a:p>
+          <a:p>
+            <a:pPr lvl="1">
+              <a:spcBef>
+                <a:spcPts val="1800"/>
+              </a:spcBef>
+            </a:pPr>
+            <a:r>
+              <a:rPr lang="pt-BR" sz="2000" dirty="0" smtClean="0"/>
+              <a:t>Se o comando acima retornar o valor da constante </a:t>
+            </a:r>
+            <a:r>
+              <a:rPr lang="pt-BR" sz="2000" dirty="0" err="1" smtClean="0">
+                <a:solidFill>
+                  <a:srgbClr val="FFC000"/>
+                </a:solidFill>
+              </a:rPr>
+              <a:t>JFileChooser</a:t>
+            </a:r>
+            <a:r>
+              <a:rPr lang="pt-BR" sz="2000" dirty="0" smtClean="0">
+                <a:solidFill>
+                  <a:srgbClr val="FFC000"/>
+                </a:solidFill>
+              </a:rPr>
+              <a:t>.APPROVE_OPTION</a:t>
+            </a:r>
+            <a:r>
+              <a:rPr lang="pt-BR" sz="2000" dirty="0" smtClean="0"/>
+              <a:t>, significa que o usuário selecionou corretamente um arquivo.</a:t>
+            </a:r>
+            <a:endParaRPr lang="pt-BR" sz="2000" dirty="0" smtClean="0"/>
+          </a:p>
+          <a:p>
+            <a:pPr lvl="1" indent="-1588">
+              <a:spcBef>
+                <a:spcPts val="1800"/>
+              </a:spcBef>
+              <a:buNone/>
+            </a:pPr>
+            <a:r>
+              <a:rPr lang="pt-BR" sz="2000" dirty="0" smtClean="0"/>
+              <a:t>Neste caso utilize o comando abaixo para capturar o arquivo selecionado:</a:t>
+            </a:r>
+          </a:p>
+          <a:p>
+            <a:pPr marL="1588" lvl="1" indent="-1588" algn="ctr">
+              <a:spcBef>
+                <a:spcPts val="1800"/>
+              </a:spcBef>
+              <a:buNone/>
+            </a:pPr>
+            <a:r>
+              <a:rPr lang="pt-BR" sz="2000" dirty="0" smtClean="0">
+                <a:solidFill>
+                  <a:srgbClr val="FFC000"/>
+                </a:solidFill>
+              </a:rPr>
+              <a:t>File arquivo = </a:t>
+            </a:r>
+            <a:r>
+              <a:rPr lang="pt-BR" sz="2000" dirty="0" err="1" smtClean="0">
+                <a:solidFill>
+                  <a:srgbClr val="FFC000"/>
+                </a:solidFill>
+              </a:rPr>
+              <a:t>jfcArquivo</a:t>
+            </a:r>
+            <a:r>
+              <a:rPr lang="pt-BR" sz="2000" dirty="0" smtClean="0">
+                <a:solidFill>
+                  <a:srgbClr val="FFC000"/>
+                </a:solidFill>
+              </a:rPr>
+              <a:t>.</a:t>
+            </a:r>
+            <a:r>
+              <a:rPr lang="pt-BR" sz="2000" dirty="0" err="1" smtClean="0">
+                <a:solidFill>
+                  <a:srgbClr val="FFC000"/>
+                </a:solidFill>
+              </a:rPr>
+              <a:t>getSelectedFile</a:t>
+            </a:r>
+            <a:r>
+              <a:rPr lang="pt-BR" sz="2000" dirty="0" smtClean="0">
+                <a:solidFill>
+                  <a:srgbClr val="FFC000"/>
+                </a:solidFill>
+              </a:rPr>
+              <a:t>();</a:t>
+            </a:r>
+          </a:p>
+          <a:p>
+            <a:pPr lvl="1" indent="-1588">
+              <a:spcBef>
+                <a:spcPts val="1800"/>
+              </a:spcBef>
+              <a:buNone/>
+            </a:pPr>
+            <a:r>
+              <a:rPr lang="pt-BR" sz="2000" dirty="0" smtClean="0"/>
+              <a:t>Carregue a caixa de texto com todo o conteúdo do arquivo acima.</a:t>
+            </a:r>
+          </a:p>
+        </p:txBody>
+      </p:sp>
+      <p:sp>
+        <p:nvSpPr>
+          <p:cNvPr id="4" name="Espaço Reservado para Número de Slide 3"/>
+          <p:cNvSpPr>
+            <a:spLocks noGrp="1"/>
+          </p:cNvSpPr>
+          <p:nvPr>
+            <p:ph type="sldNum" sz="quarter" idx="12"/>
+          </p:nvPr>
+        </p:nvSpPr>
+        <p:spPr/>
+        <p:txBody>
+          <a:bodyPr/>
+          <a:lstStyle/>
+          <a:p>
+            <a:pPr>
+              <a:defRPr/>
+            </a:pPr>
+            <a:fld id="{676AE120-6210-44C4-9C14-8704E13AF0BD}" type="slidenum">
+              <a:rPr lang="pt-BR" smtClean="0"/>
+              <a:pPr>
+                <a:defRPr/>
+              </a:pPr>
+              <a:t>31</a:t>
+            </a:fld>
+            <a:endParaRPr lang="pt-BR"/>
+          </a:p>
+        </p:txBody>
+      </p:sp>
+    </p:spTree>
+  </p:cSld>
+  <p:clrMapOvr>
+    <a:masterClrMapping/>
+  </p:clrMapOvr>
+  <p:timing>
+    <p:tnLst>
+      <p:par>
+        <p:cTn id="1" dur="indefinite" restart="never" nodeType="tmRoot"/>
+      </p:par>
+    </p:tnLst>
+  </p:timing>
+</p:sld>
+</file>
+
+<file path=ppt/slides/slide32.xml><?xml version="1.0" encoding="utf-8"?>
+<p:sld xmlns:a="http://schemas.openxmlformats.org/drawingml/2006/main" xmlns:r="http://schemas.openxmlformats.org/officeDocument/2006/relationships" xmlns:p="http://schemas.openxmlformats.org/presentationml/2006/main">
+  <p:cSld>
+    <p:spTree>
+      <p:nvGrpSpPr>
+        <p:cNvPr id="1" name=""/>
+        <p:cNvGrpSpPr/>
+        <p:nvPr/>
+      </p:nvGrpSpPr>
+      <p:grpSpPr>
+        <a:xfrm>
+          <a:off x="0" y="0"/>
+          <a:ext cx="0" cy="0"/>
+          <a:chOff x="0" y="0"/>
+          <a:chExt cx="0" cy="0"/>
+        </a:xfrm>
+      </p:grpSpPr>
+      <p:sp>
+        <p:nvSpPr>
+          <p:cNvPr id="2" name="Título 1"/>
+          <p:cNvSpPr>
+            <a:spLocks noGrp="1"/>
+          </p:cNvSpPr>
+          <p:nvPr>
+            <p:ph type="title"/>
+          </p:nvPr>
+        </p:nvSpPr>
+        <p:spPr>
+          <a:xfrm>
+            <a:off x="251520" y="274638"/>
+            <a:ext cx="7467600" cy="1143000"/>
+          </a:xfrm>
+        </p:spPr>
+        <p:txBody>
+          <a:bodyPr/>
+          <a:lstStyle/>
+          <a:p>
+            <a:r>
+              <a:rPr lang="pt-BR" sz="4400" dirty="0" smtClean="0"/>
+              <a:t>Exercício </a:t>
+            </a:r>
+            <a:r>
+              <a:rPr lang="pt-BR" sz="4400" dirty="0" smtClean="0"/>
+              <a:t>(continuação)</a:t>
+            </a:r>
+            <a:endParaRPr lang="pt-BR" sz="4400" dirty="0"/>
+          </a:p>
+        </p:txBody>
+      </p:sp>
+      <p:sp>
+        <p:nvSpPr>
+          <p:cNvPr id="3" name="Espaço Reservado para Conteúdo 2"/>
+          <p:cNvSpPr>
+            <a:spLocks noGrp="1"/>
+          </p:cNvSpPr>
+          <p:nvPr>
+            <p:ph idx="1"/>
+          </p:nvPr>
+        </p:nvSpPr>
+        <p:spPr/>
+        <p:txBody>
+          <a:bodyPr/>
+          <a:lstStyle/>
+          <a:p>
+            <a:r>
+              <a:rPr lang="pt-BR" sz="2400" dirty="0" smtClean="0"/>
+              <a:t>Comando “</a:t>
+            </a:r>
+            <a:r>
+              <a:rPr lang="pt-BR" sz="2400" dirty="0" smtClean="0">
+                <a:solidFill>
+                  <a:srgbClr val="FFC000"/>
+                </a:solidFill>
+              </a:rPr>
+              <a:t>Salvar</a:t>
+            </a:r>
+            <a:r>
+              <a:rPr lang="pt-BR" sz="2400" dirty="0" smtClean="0"/>
+              <a:t>”</a:t>
+            </a:r>
+          </a:p>
+          <a:p>
+            <a:pPr lvl="1">
+              <a:spcBef>
+                <a:spcPts val="1800"/>
+              </a:spcBef>
+            </a:pPr>
+            <a:r>
+              <a:rPr lang="pt-BR" sz="2000" dirty="0" smtClean="0"/>
+              <a:t>Solicita que o usuário escolha </a:t>
+            </a:r>
+            <a:r>
+              <a:rPr lang="pt-BR" sz="2000" dirty="0" smtClean="0"/>
+              <a:t>arquivo existente ou digite o nome de um novo arquivo através </a:t>
+            </a:r>
+            <a:r>
+              <a:rPr lang="pt-BR" sz="2000" dirty="0" smtClean="0"/>
+              <a:t>do comando </a:t>
+            </a:r>
+            <a:r>
+              <a:rPr lang="pt-BR" sz="2000" dirty="0" err="1" smtClean="0">
+                <a:solidFill>
+                  <a:srgbClr val="FFC000"/>
+                </a:solidFill>
+              </a:rPr>
+              <a:t>jfcArquivo</a:t>
+            </a:r>
+            <a:r>
+              <a:rPr lang="pt-BR" sz="2000" dirty="0" smtClean="0">
+                <a:solidFill>
+                  <a:srgbClr val="FFC000"/>
+                </a:solidFill>
+              </a:rPr>
+              <a:t>.</a:t>
+            </a:r>
+            <a:r>
+              <a:rPr lang="pt-BR" sz="2000" dirty="0" err="1" smtClean="0">
+                <a:solidFill>
+                  <a:srgbClr val="FFC000"/>
+                </a:solidFill>
+              </a:rPr>
+              <a:t>showSaveDialog</a:t>
+            </a:r>
+            <a:r>
+              <a:rPr lang="pt-BR" sz="2000" dirty="0" smtClean="0">
+                <a:solidFill>
+                  <a:srgbClr val="FFC000"/>
+                </a:solidFill>
+              </a:rPr>
+              <a:t>()</a:t>
+            </a:r>
+            <a:r>
+              <a:rPr lang="pt-BR" sz="2000" dirty="0" smtClean="0"/>
+              <a:t>;</a:t>
+            </a:r>
+          </a:p>
+          <a:p>
+            <a:pPr lvl="1">
+              <a:spcBef>
+                <a:spcPts val="1800"/>
+              </a:spcBef>
+            </a:pPr>
+            <a:r>
+              <a:rPr lang="pt-BR" sz="2000" dirty="0" smtClean="0"/>
+              <a:t>Se o comando acima retornar o valor da constante </a:t>
+            </a:r>
+            <a:r>
+              <a:rPr lang="pt-BR" sz="2000" dirty="0" err="1" smtClean="0">
+                <a:solidFill>
+                  <a:srgbClr val="FFC000"/>
+                </a:solidFill>
+              </a:rPr>
+              <a:t>JFileChooser</a:t>
+            </a:r>
+            <a:r>
+              <a:rPr lang="pt-BR" sz="2000" dirty="0" smtClean="0">
+                <a:solidFill>
+                  <a:srgbClr val="FFC000"/>
+                </a:solidFill>
+              </a:rPr>
+              <a:t>.APPROVE_OPTION</a:t>
+            </a:r>
+            <a:r>
+              <a:rPr lang="pt-BR" sz="2000" dirty="0" smtClean="0"/>
+              <a:t>, </a:t>
+            </a:r>
+            <a:r>
+              <a:rPr lang="pt-BR" sz="2000" dirty="0" smtClean="0"/>
+              <a:t>salve todo o conteúdo da caixa de texto no arquivo obtido pelo comando abaixo:</a:t>
+            </a:r>
+            <a:endParaRPr lang="pt-BR" sz="2000" dirty="0" smtClean="0"/>
+          </a:p>
+          <a:p>
+            <a:pPr marL="1588" lvl="1" indent="-1588" algn="ctr">
+              <a:spcBef>
+                <a:spcPts val="1800"/>
+              </a:spcBef>
+              <a:buNone/>
+            </a:pPr>
+            <a:r>
+              <a:rPr lang="pt-BR" sz="2000" dirty="0" smtClean="0">
+                <a:solidFill>
+                  <a:srgbClr val="FFC000"/>
+                </a:solidFill>
+              </a:rPr>
+              <a:t>File </a:t>
+            </a:r>
+            <a:r>
+              <a:rPr lang="pt-BR" sz="2000" dirty="0" smtClean="0">
+                <a:solidFill>
+                  <a:srgbClr val="FFC000"/>
+                </a:solidFill>
+              </a:rPr>
+              <a:t>arquivo = </a:t>
+            </a:r>
+            <a:r>
+              <a:rPr lang="pt-BR" sz="2000" dirty="0" err="1" smtClean="0">
+                <a:solidFill>
+                  <a:srgbClr val="FFC000"/>
+                </a:solidFill>
+              </a:rPr>
+              <a:t>jfcArquivo</a:t>
+            </a:r>
+            <a:r>
+              <a:rPr lang="pt-BR" sz="2000" dirty="0" smtClean="0">
+                <a:solidFill>
+                  <a:srgbClr val="FFC000"/>
+                </a:solidFill>
+              </a:rPr>
+              <a:t>.</a:t>
+            </a:r>
+            <a:r>
+              <a:rPr lang="pt-BR" sz="2000" dirty="0" err="1" smtClean="0">
+                <a:solidFill>
+                  <a:srgbClr val="FFC000"/>
+                </a:solidFill>
+              </a:rPr>
+              <a:t>getSelectedFile</a:t>
+            </a:r>
+            <a:r>
+              <a:rPr lang="pt-BR" sz="2000" dirty="0" smtClean="0">
+                <a:solidFill>
+                  <a:srgbClr val="FFC000"/>
+                </a:solidFill>
+              </a:rPr>
+              <a:t>();</a:t>
+            </a:r>
+            <a:endParaRPr lang="pt-BR" sz="2000" dirty="0" smtClean="0">
+              <a:solidFill>
+                <a:srgbClr val="FFC000"/>
+              </a:solidFill>
+            </a:endParaRPr>
+          </a:p>
+        </p:txBody>
+      </p:sp>
+      <p:sp>
+        <p:nvSpPr>
+          <p:cNvPr id="4" name="Espaço Reservado para Número de Slide 3"/>
+          <p:cNvSpPr>
+            <a:spLocks noGrp="1"/>
+          </p:cNvSpPr>
+          <p:nvPr>
+            <p:ph type="sldNum" sz="quarter" idx="12"/>
+          </p:nvPr>
+        </p:nvSpPr>
+        <p:spPr/>
+        <p:txBody>
+          <a:bodyPr/>
+          <a:lstStyle/>
+          <a:p>
+            <a:pPr>
+              <a:defRPr/>
+            </a:pPr>
+            <a:fld id="{676AE120-6210-44C4-9C14-8704E13AF0BD}" type="slidenum">
+              <a:rPr lang="pt-BR" smtClean="0"/>
+              <a:pPr>
+                <a:defRPr/>
+              </a:pPr>
+              <a:t>32</a:t>
+            </a:fld>
+            <a:endParaRPr lang="pt-BR"/>
+          </a:p>
+        </p:txBody>
+      </p:sp>
+    </p:spTree>
+  </p:cSld>
+  <p:clrMapOvr>
+    <a:masterClrMapping/>
+  </p:clrMapOvr>
+  <p:timing>
+    <p:tnLst>
+      <p:par>
+        <p:cTn id="1" dur="indefinite" restart="never" nodeType="tmRoot"/>
+      </p:par>
+    </p:tnLst>
+  </p:timing>
+</p:sld>
+</file>
+
+<file path=ppt/slides/slide33.xml><?xml version="1.0" encoding="utf-8"?>
+<p:sld xmlns:a="http://schemas.openxmlformats.org/drawingml/2006/main" xmlns:r="http://schemas.openxmlformats.org/officeDocument/2006/relationships" xmlns:p="http://schemas.openxmlformats.org/presentationml/2006/main">
+  <p:cSld>
+    <p:spTree>
+      <p:nvGrpSpPr>
+        <p:cNvPr id="1" name=""/>
+        <p:cNvGrpSpPr/>
+        <p:nvPr/>
+      </p:nvGrpSpPr>
+      <p:grpSpPr>
+        <a:xfrm>
+          <a:off x="0" y="0"/>
+          <a:ext cx="0" cy="0"/>
+          <a:chOff x="0" y="0"/>
+          <a:chExt cx="0" cy="0"/>
+        </a:xfrm>
+      </p:grpSpPr>
+      <p:sp>
+        <p:nvSpPr>
+          <p:cNvPr id="2" name="Título 1"/>
+          <p:cNvSpPr>
+            <a:spLocks noGrp="1"/>
+          </p:cNvSpPr>
+          <p:nvPr>
+            <p:ph type="title"/>
+          </p:nvPr>
+        </p:nvSpPr>
+        <p:spPr>
+          <a:xfrm>
+            <a:off x="251520" y="274638"/>
+            <a:ext cx="7467600" cy="1143000"/>
+          </a:xfrm>
+        </p:spPr>
+        <p:txBody>
+          <a:bodyPr/>
+          <a:lstStyle/>
+          <a:p>
+            <a:r>
+              <a:rPr lang="pt-BR" sz="4400" dirty="0" smtClean="0"/>
+              <a:t>Exercício (fim)</a:t>
+            </a:r>
+            <a:endParaRPr lang="pt-BR" sz="4400" dirty="0"/>
+          </a:p>
+        </p:txBody>
+      </p:sp>
+      <p:sp>
+        <p:nvSpPr>
+          <p:cNvPr id="3" name="Espaço Reservado para Conteúdo 2"/>
+          <p:cNvSpPr>
+            <a:spLocks noGrp="1"/>
+          </p:cNvSpPr>
+          <p:nvPr>
+            <p:ph idx="1"/>
+          </p:nvPr>
+        </p:nvSpPr>
+        <p:spPr/>
+        <p:txBody>
+          <a:bodyPr/>
+          <a:lstStyle/>
+          <a:p>
+            <a:r>
+              <a:rPr lang="pt-BR" sz="2400" dirty="0" smtClean="0"/>
+              <a:t>Sair</a:t>
+            </a:r>
+          </a:p>
+          <a:p>
+            <a:pPr lvl="1"/>
+            <a:r>
+              <a:rPr lang="pt-BR" sz="2000" dirty="0" smtClean="0"/>
+              <a:t>Fecha a janela com o método </a:t>
+            </a:r>
+            <a:r>
+              <a:rPr lang="pt-BR" sz="2000" dirty="0" err="1" smtClean="0">
+                <a:solidFill>
+                  <a:srgbClr val="FFC000"/>
+                </a:solidFill>
+              </a:rPr>
+              <a:t>dispose</a:t>
+            </a:r>
+            <a:r>
+              <a:rPr lang="pt-BR" sz="2000" dirty="0" smtClean="0">
+                <a:solidFill>
+                  <a:srgbClr val="FFC000"/>
+                </a:solidFill>
+              </a:rPr>
+              <a:t>()</a:t>
+            </a:r>
+            <a:endParaRPr lang="pt-BR" sz="2000" dirty="0">
+              <a:solidFill>
+                <a:srgbClr val="FFC000"/>
+              </a:solidFill>
+            </a:endParaRPr>
+          </a:p>
+        </p:txBody>
+      </p:sp>
+      <p:sp>
+        <p:nvSpPr>
+          <p:cNvPr id="4" name="Espaço Reservado para Número de Slide 3"/>
+          <p:cNvSpPr>
+            <a:spLocks noGrp="1"/>
+          </p:cNvSpPr>
+          <p:nvPr>
+            <p:ph type="sldNum" sz="quarter" idx="12"/>
+          </p:nvPr>
+        </p:nvSpPr>
+        <p:spPr/>
+        <p:txBody>
+          <a:bodyPr/>
+          <a:lstStyle/>
+          <a:p>
+            <a:pPr>
+              <a:defRPr/>
+            </a:pPr>
+            <a:fld id="{676AE120-6210-44C4-9C14-8704E13AF0BD}" type="slidenum">
+              <a:rPr lang="pt-BR" smtClean="0"/>
+              <a:pPr>
+                <a:defRPr/>
+              </a:pPr>
+              <a:t>33</a:t>
+            </a:fld>
+            <a:endParaRPr lang="pt-BR"/>
+          </a:p>
+        </p:txBody>
+      </p:sp>
+    </p:spTree>
+  </p:cSld>
+  <p:clrMapOvr>
+    <a:masterClrMapping/>
+  </p:clrMapOvr>
+  <p:timing>
+    <p:tnLst>
+      <p:par>
+        <p:cTn id="1" dur="indefinite" restart="never" nodeType="tmRoot"/>
+      </p:par>
+    </p:tnLst>
+  </p:timing>
+</p:sld>
+</file>
+
+<file path=ppt/slides/slide34.xml><?xml version="1.0" encoding="utf-8"?>
+<p:sld xmlns:a="http://schemas.openxmlformats.org/drawingml/2006/main" xmlns:r="http://schemas.openxmlformats.org/officeDocument/2006/relationships" xmlns:p="http://schemas.openxmlformats.org/presentationml/2006/main">
+  <p:cSld>
+    <p:spTree>
+      <p:nvGrpSpPr>
+        <p:cNvPr id="1" name=""/>
+        <p:cNvGrpSpPr/>
+        <p:nvPr/>
+      </p:nvGrpSpPr>
+      <p:grpSpPr>
+        <a:xfrm>
+          <a:off x="0" y="0"/>
+          <a:ext cx="0" cy="0"/>
+          <a:chOff x="0" y="0"/>
+          <a:chExt cx="0" cy="0"/>
+        </a:xfrm>
+      </p:grpSpPr>
+      <p:sp>
+        <p:nvSpPr>
+          <p:cNvPr id="2" name="Título 1"/>
+          <p:cNvSpPr>
+            <a:spLocks noGrp="1"/>
+          </p:cNvSpPr>
+          <p:nvPr>
+            <p:ph type="title"/>
+          </p:nvPr>
+        </p:nvSpPr>
+        <p:spPr>
+          <a:xfrm>
+            <a:off x="251520" y="274638"/>
+            <a:ext cx="7467600" cy="1143000"/>
+          </a:xfrm>
+        </p:spPr>
+        <p:txBody>
+          <a:bodyPr/>
+          <a:lstStyle/>
+          <a:p>
+            <a:r>
+              <a:rPr lang="pt-BR" sz="4400" dirty="0" smtClean="0"/>
+              <a:t>Exercício </a:t>
+            </a:r>
+            <a:r>
+              <a:rPr lang="pt-BR" sz="4400" dirty="0" smtClean="0"/>
+              <a:t>(desafio 1)</a:t>
+            </a:r>
+            <a:endParaRPr lang="pt-BR" sz="4400" dirty="0"/>
+          </a:p>
+        </p:txBody>
+      </p:sp>
+      <p:sp>
+        <p:nvSpPr>
+          <p:cNvPr id="3" name="Espaço Reservado para Conteúdo 2"/>
+          <p:cNvSpPr>
+            <a:spLocks noGrp="1"/>
+          </p:cNvSpPr>
+          <p:nvPr>
+            <p:ph idx="1"/>
+          </p:nvPr>
+        </p:nvSpPr>
+        <p:spPr/>
+        <p:txBody>
+          <a:bodyPr/>
+          <a:lstStyle/>
+          <a:p>
+            <a:pPr marL="493712" indent="-457200"/>
+            <a:r>
+              <a:rPr lang="pt-BR" sz="2400" dirty="0" smtClean="0"/>
+              <a:t>Sobrepor arquivo existente</a:t>
+            </a:r>
+          </a:p>
+          <a:p>
+            <a:pPr lvl="1"/>
+            <a:r>
+              <a:rPr lang="pt-BR" sz="2000" dirty="0" smtClean="0"/>
+              <a:t>Altere o comando “Salvar” para que verifique se o arquivo selecionado já existe.</a:t>
+            </a:r>
+          </a:p>
+          <a:p>
+            <a:pPr lvl="1"/>
+            <a:r>
+              <a:rPr lang="pt-BR" sz="2000" dirty="0" smtClean="0"/>
+              <a:t>Se sim, pergunte ao usuário se deseja sobrepor o arquivo selecionado.</a:t>
+            </a:r>
+          </a:p>
+          <a:p>
+            <a:pPr lvl="1"/>
+            <a:endParaRPr lang="pt-BR" sz="2000" dirty="0" smtClean="0"/>
+          </a:p>
+          <a:p>
+            <a:pPr lvl="1"/>
+            <a:endParaRPr lang="pt-BR" sz="2000" dirty="0" smtClean="0"/>
+          </a:p>
+          <a:p>
+            <a:pPr lvl="1"/>
+            <a:endParaRPr lang="pt-BR" sz="2000" dirty="0" smtClean="0"/>
+          </a:p>
+          <a:p>
+            <a:pPr lvl="1"/>
+            <a:endParaRPr lang="pt-BR" sz="2000" dirty="0" smtClean="0"/>
+          </a:p>
+          <a:p>
+            <a:pPr lvl="1"/>
+            <a:r>
+              <a:rPr lang="pt-BR" sz="2000" dirty="0" smtClean="0"/>
+              <a:t>Se o objeto </a:t>
+            </a:r>
+            <a:r>
+              <a:rPr lang="pt-BR" sz="2000" dirty="0" err="1" smtClean="0">
+                <a:solidFill>
+                  <a:srgbClr val="FFC000"/>
+                </a:solidFill>
+              </a:rPr>
+              <a:t>jfcArquivo</a:t>
+            </a:r>
+            <a:r>
+              <a:rPr lang="pt-BR" sz="2000" dirty="0" smtClean="0"/>
+              <a:t> já possui um arquivo selecionado, não é necessário exibir novamente a caixa de diálogo “Salvar”. Desta forma, o nome do arquivo só será perguntado na primeira vez.</a:t>
+            </a:r>
+          </a:p>
+        </p:txBody>
+      </p:sp>
+      <p:sp>
+        <p:nvSpPr>
+          <p:cNvPr id="4" name="Espaço Reservado para Número de Slide 3"/>
+          <p:cNvSpPr>
+            <a:spLocks noGrp="1"/>
+          </p:cNvSpPr>
+          <p:nvPr>
+            <p:ph type="sldNum" sz="quarter" idx="12"/>
+          </p:nvPr>
+        </p:nvSpPr>
+        <p:spPr/>
+        <p:txBody>
+          <a:bodyPr/>
+          <a:lstStyle/>
+          <a:p>
+            <a:pPr>
+              <a:defRPr/>
+            </a:pPr>
+            <a:fld id="{676AE120-6210-44C4-9C14-8704E13AF0BD}" type="slidenum">
+              <a:rPr lang="pt-BR" smtClean="0"/>
+              <a:pPr>
+                <a:defRPr/>
+              </a:pPr>
+              <a:t>34</a:t>
+            </a:fld>
+            <a:endParaRPr lang="pt-BR"/>
+          </a:p>
+        </p:txBody>
+      </p:sp>
+      <p:pic>
+        <p:nvPicPr>
+          <p:cNvPr id="5" name="Imagem 4" descr="Save.png"/>
+          <p:cNvPicPr>
+            <a:picLocks noChangeAspect="1"/>
+          </p:cNvPicPr>
+          <p:nvPr/>
+        </p:nvPicPr>
+        <p:blipFill>
+          <a:blip r:embed="rId3" cstate="print"/>
+          <a:stretch>
+            <a:fillRect/>
+          </a:stretch>
+        </p:blipFill>
+        <p:spPr>
+          <a:xfrm>
+            <a:off x="2771800" y="3501008"/>
+            <a:ext cx="3581900" cy="1219370"/>
+          </a:xfrm>
+          <a:prstGeom prst="rect">
+            <a:avLst/>
+          </a:prstGeom>
+        </p:spPr>
+      </p:pic>
+    </p:spTree>
+  </p:cSld>
+  <p:clrMapOvr>
+    <a:masterClrMapping/>
+  </p:clrMapOvr>
+  <p:timing>
+    <p:tnLst>
+      <p:par>
+        <p:cTn id="1" dur="indefinite" restart="never" nodeType="tmRoot"/>
+      </p:par>
+    </p:tnLst>
+  </p:timing>
+</p:sld>
+</file>
+
+<file path=ppt/slides/slide35.xml><?xml version="1.0" encoding="utf-8"?>
+<p:sld xmlns:a="http://schemas.openxmlformats.org/drawingml/2006/main" xmlns:r="http://schemas.openxmlformats.org/officeDocument/2006/relationships" xmlns:p="http://schemas.openxmlformats.org/presentationml/2006/main">
+  <p:cSld>
+    <p:spTree>
+      <p:nvGrpSpPr>
+        <p:cNvPr id="1" name=""/>
+        <p:cNvGrpSpPr/>
+        <p:nvPr/>
+      </p:nvGrpSpPr>
+      <p:grpSpPr>
+        <a:xfrm>
+          <a:off x="0" y="0"/>
+          <a:ext cx="0" cy="0"/>
+          <a:chOff x="0" y="0"/>
+          <a:chExt cx="0" cy="0"/>
+        </a:xfrm>
+      </p:grpSpPr>
+      <p:sp>
+        <p:nvSpPr>
+          <p:cNvPr id="2" name="Título 1"/>
+          <p:cNvSpPr>
+            <a:spLocks noGrp="1"/>
+          </p:cNvSpPr>
+          <p:nvPr>
+            <p:ph type="title"/>
+          </p:nvPr>
+        </p:nvSpPr>
+        <p:spPr>
+          <a:xfrm>
+            <a:off x="251520" y="274638"/>
+            <a:ext cx="7467600" cy="1143000"/>
+          </a:xfrm>
+        </p:spPr>
+        <p:txBody>
+          <a:bodyPr/>
+          <a:lstStyle/>
+          <a:p>
+            <a:r>
+              <a:rPr lang="pt-BR" sz="4400" dirty="0" smtClean="0"/>
+              <a:t>Exercício </a:t>
+            </a:r>
+            <a:r>
+              <a:rPr lang="pt-BR" sz="4400" dirty="0" smtClean="0"/>
+              <a:t>(desafio 2)</a:t>
+            </a:r>
+            <a:endParaRPr lang="pt-BR" sz="4400" dirty="0"/>
+          </a:p>
+        </p:txBody>
+      </p:sp>
+      <p:sp>
+        <p:nvSpPr>
+          <p:cNvPr id="3" name="Espaço Reservado para Conteúdo 2"/>
+          <p:cNvSpPr>
+            <a:spLocks noGrp="1"/>
+          </p:cNvSpPr>
+          <p:nvPr>
+            <p:ph idx="1"/>
+          </p:nvPr>
+        </p:nvSpPr>
+        <p:spPr/>
+        <p:txBody>
+          <a:bodyPr/>
+          <a:lstStyle/>
+          <a:p>
+            <a:pPr marL="493712" indent="-457200"/>
+            <a:r>
+              <a:rPr lang="pt-BR" sz="2000" dirty="0" smtClean="0"/>
+              <a:t>Confirmação de fechamento</a:t>
+            </a:r>
+          </a:p>
+          <a:p>
+            <a:pPr lvl="1"/>
+            <a:r>
+              <a:rPr lang="pt-BR" sz="1800" dirty="0" smtClean="0"/>
+              <a:t>Ao fechar a janela verifique se o conteúdo da caixa de texto já foi salvo.</a:t>
+            </a:r>
+          </a:p>
+          <a:p>
+            <a:pPr lvl="1"/>
+            <a:endParaRPr lang="pt-BR" sz="1800" dirty="0" smtClean="0"/>
+          </a:p>
+          <a:p>
+            <a:pPr lvl="1"/>
+            <a:endParaRPr lang="pt-BR" sz="1800" dirty="0" smtClean="0"/>
+          </a:p>
+          <a:p>
+            <a:pPr lvl="1"/>
+            <a:endParaRPr lang="pt-BR" sz="1800" dirty="0" smtClean="0"/>
+          </a:p>
+          <a:p>
+            <a:r>
+              <a:rPr lang="pt-BR" sz="2000" dirty="0" smtClean="0"/>
+              <a:t>Dica</a:t>
+            </a:r>
+          </a:p>
+          <a:p>
+            <a:pPr lvl="1"/>
+            <a:r>
+              <a:rPr lang="pt-BR" sz="1800" dirty="0" smtClean="0"/>
+              <a:t>Crie um atributo booleano </a:t>
+            </a:r>
+            <a:r>
+              <a:rPr lang="pt-BR" sz="1800" dirty="0" err="1" smtClean="0">
+                <a:solidFill>
+                  <a:srgbClr val="FFC000"/>
+                </a:solidFill>
+              </a:rPr>
+              <a:t>saved</a:t>
+            </a:r>
+            <a:r>
+              <a:rPr lang="pt-BR" sz="1800" dirty="0" smtClean="0"/>
+              <a:t> na classe que será utilizada pelos comandos para lembrar se o texto foi salvo ou não;</a:t>
+            </a:r>
+          </a:p>
+          <a:p>
+            <a:pPr lvl="1"/>
+            <a:r>
+              <a:rPr lang="pt-BR" sz="1800" dirty="0" smtClean="0"/>
+              <a:t>Altere a propriedade </a:t>
+            </a:r>
+            <a:r>
+              <a:rPr lang="pt-BR" sz="1800" dirty="0" err="1" smtClean="0">
+                <a:solidFill>
+                  <a:srgbClr val="FFC000"/>
+                </a:solidFill>
+              </a:rPr>
+              <a:t>defaultCloseOperation</a:t>
+            </a:r>
+            <a:r>
+              <a:rPr lang="pt-BR" sz="1800" dirty="0" smtClean="0"/>
+              <a:t> da janela para </a:t>
+            </a:r>
+            <a:r>
+              <a:rPr lang="pt-BR" sz="1800" dirty="0" smtClean="0">
+                <a:solidFill>
+                  <a:srgbClr val="FFC000"/>
+                </a:solidFill>
+              </a:rPr>
+              <a:t>NOTHING_ON_CLOSE</a:t>
+            </a:r>
+            <a:r>
+              <a:rPr lang="pt-BR" sz="1800" dirty="0" smtClean="0"/>
+              <a:t>. Desta forma você terá controle sobre o clique no botão fechar;</a:t>
+            </a:r>
+          </a:p>
+          <a:p>
+            <a:pPr lvl="1"/>
+            <a:r>
+              <a:rPr lang="pt-BR" sz="1800" dirty="0" smtClean="0"/>
+              <a:t>Implemente o evento </a:t>
+            </a:r>
+            <a:r>
+              <a:rPr lang="pt-BR" sz="1800" dirty="0" err="1" smtClean="0">
+                <a:solidFill>
+                  <a:srgbClr val="FFC000"/>
+                </a:solidFill>
+              </a:rPr>
+              <a:t>windowClosing</a:t>
+            </a:r>
+            <a:r>
+              <a:rPr lang="pt-BR" sz="1800" dirty="0" smtClean="0"/>
+              <a:t> de sua janela para fazer a verificação antes de fechar a janela.</a:t>
+            </a:r>
+          </a:p>
+        </p:txBody>
+      </p:sp>
+      <p:sp>
+        <p:nvSpPr>
+          <p:cNvPr id="4" name="Espaço Reservado para Número de Slide 3"/>
+          <p:cNvSpPr>
+            <a:spLocks noGrp="1"/>
+          </p:cNvSpPr>
+          <p:nvPr>
+            <p:ph type="sldNum" sz="quarter" idx="12"/>
+          </p:nvPr>
+        </p:nvSpPr>
+        <p:spPr/>
+        <p:txBody>
+          <a:bodyPr/>
+          <a:lstStyle/>
+          <a:p>
+            <a:pPr>
+              <a:defRPr/>
+            </a:pPr>
+            <a:fld id="{676AE120-6210-44C4-9C14-8704E13AF0BD}" type="slidenum">
+              <a:rPr lang="pt-BR" smtClean="0"/>
+              <a:pPr>
+                <a:defRPr/>
+              </a:pPr>
+              <a:t>35</a:t>
+            </a:fld>
+            <a:endParaRPr lang="pt-BR"/>
+          </a:p>
+        </p:txBody>
+      </p:sp>
+      <p:pic>
+        <p:nvPicPr>
+          <p:cNvPr id="5" name="Imagem 4" descr="Fechar.png"/>
+          <p:cNvPicPr>
+            <a:picLocks noChangeAspect="1"/>
+          </p:cNvPicPr>
+          <p:nvPr/>
+        </p:nvPicPr>
+        <p:blipFill>
+          <a:blip r:embed="rId3" cstate="print"/>
+          <a:stretch>
+            <a:fillRect/>
+          </a:stretch>
+        </p:blipFill>
+        <p:spPr>
+          <a:xfrm>
+            <a:off x="2987824" y="2492896"/>
+            <a:ext cx="2991268" cy="1219370"/>
+          </a:xfrm>
+          <a:prstGeom prst="rect">
+            <a:avLst/>
+          </a:prstGeom>
+        </p:spPr>
+      </p:pic>
+    </p:spTree>
+  </p:cSld>
+  <p:clrMapOvr>
+    <a:masterClrMapping/>
+  </p:clrMapOvr>
+  <p:timing>
+    <p:tnLst>
+      <p:par>
+        <p:cTn id="1" dur="indefinite" restart="never" nodeType="tmRoot"/>
+      </p:par>
+    </p:tnLst>
+  </p:timing>
 </p:sld>
 </file>
 

</xml_diff>